<commit_message>
add metrics tables to presentation
</commit_message>
<xml_diff>
--- a/6. Documentation/Telecom Customer Churn Prediction.pptx
+++ b/6. Documentation/Telecom Customer Churn Prediction.pptx
@@ -5,17 +5,22 @@
     <p:sldMasterId id="2147483744" r:id="rId4"/>
   </p:sldMasterIdLst>
   <p:notesMasterIdLst>
-    <p:notesMasterId r:id="rId10"/>
+    <p:notesMasterId r:id="rId15"/>
   </p:notesMasterIdLst>
   <p:handoutMasterIdLst>
-    <p:handoutMasterId r:id="rId11"/>
+    <p:handoutMasterId r:id="rId16"/>
   </p:handoutMasterIdLst>
   <p:sldIdLst>
     <p:sldId id="256" r:id="rId5"/>
     <p:sldId id="258" r:id="rId6"/>
-    <p:sldId id="260" r:id="rId7"/>
-    <p:sldId id="264" r:id="rId8"/>
-    <p:sldId id="274" r:id="rId9"/>
+    <p:sldId id="276" r:id="rId7"/>
+    <p:sldId id="260" r:id="rId8"/>
+    <p:sldId id="275" r:id="rId9"/>
+    <p:sldId id="277" r:id="rId10"/>
+    <p:sldId id="278" r:id="rId11"/>
+    <p:sldId id="279" r:id="rId12"/>
+    <p:sldId id="264" r:id="rId13"/>
+    <p:sldId id="274" r:id="rId14"/>
   </p:sldIdLst>
   <p:sldSz cx="12192000" cy="6858000"/>
   <p:notesSz cx="6858000" cy="9144000"/>
@@ -8664,7 +8669,7 @@
           <a:p>
             <a:fld id="{F3544625-0ADF-4414-89A2-9E135F0C849F}" type="slidenum">
               <a:rPr lang="en-US" smtClean="0"/>
-              <a:t>3</a:t>
+              <a:t>4</a:t>
             </a:fld>
             <a:endParaRPr lang="en-US" dirty="0"/>
           </a:p>
@@ -8748,7 +8753,7 @@
           <a:p>
             <a:fld id="{F3544625-0ADF-4414-89A2-9E135F0C849F}" type="slidenum">
               <a:rPr lang="en-US" smtClean="0"/>
-              <a:t>4</a:t>
+              <a:t>9</a:t>
             </a:fld>
             <a:endParaRPr lang="en-US" dirty="0"/>
           </a:p>
@@ -8832,7 +8837,7 @@
           <a:p>
             <a:fld id="{F3544625-0ADF-4414-89A2-9E135F0C849F}" type="slidenum">
               <a:rPr lang="en-US" smtClean="0"/>
-              <a:t>5</a:t>
+              <a:t>10</a:t>
             </a:fld>
             <a:endParaRPr lang="en-US" dirty="0"/>
           </a:p>
@@ -14720,6 +14725,149 @@
 </p:sld>
 </file>
 
+<file path=ppt/slides/slide10.xml><?xml version="1.0" encoding="utf-8"?>
+<p:sld xmlns:a="http://schemas.openxmlformats.org/drawingml/2006/main" xmlns:r="http://schemas.openxmlformats.org/officeDocument/2006/relationships" xmlns:p="http://schemas.openxmlformats.org/presentationml/2006/main">
+  <p:cSld>
+    <p:spTree>
+      <p:nvGrpSpPr>
+        <p:cNvPr id="1" name=""/>
+        <p:cNvGrpSpPr/>
+        <p:nvPr/>
+      </p:nvGrpSpPr>
+      <p:grpSpPr>
+        <a:xfrm>
+          <a:off x="0" y="0"/>
+          <a:ext cx="0" cy="0"/>
+          <a:chOff x="0" y="0"/>
+          <a:chExt cx="0" cy="0"/>
+        </a:xfrm>
+      </p:grpSpPr>
+      <p:pic>
+        <p:nvPicPr>
+          <p:cNvPr id="5" name="Picture 4" descr="light spots">
+            <a:extLst>
+              <a:ext uri="{FF2B5EF4-FFF2-40B4-BE49-F238E27FC236}">
+                <a16:creationId xmlns:a16="http://schemas.microsoft.com/office/drawing/2014/main" id="{20A520D0-11CF-4639-8537-F56A8A2FDCFD}"/>
+              </a:ext>
+            </a:extLst>
+          </p:cNvPr>
+          <p:cNvPicPr>
+            <a:picLocks noChangeAspect="1"/>
+          </p:cNvPicPr>
+          <p:nvPr/>
+        </p:nvPicPr>
+        <p:blipFill rotWithShape="1">
+          <a:blip r:embed="rId3">
+            <a:alphaModFix amt="20000"/>
+            <a:extLst>
+              <a:ext uri="{28A0092B-C50C-407E-A947-70E740481C1C}">
+                <a14:useLocalDpi xmlns:a14="http://schemas.microsoft.com/office/drawing/2010/main"/>
+              </a:ext>
+            </a:extLst>
+          </a:blip>
+          <a:srcRect/>
+          <a:stretch/>
+        </p:blipFill>
+        <p:spPr>
+          <a:xfrm>
+            <a:off x="20" y="10"/>
+            <a:ext cx="12191980" cy="6857990"/>
+          </a:xfrm>
+          <a:prstGeom prst="rect">
+            <a:avLst/>
+          </a:prstGeom>
+        </p:spPr>
+      </p:pic>
+      <p:sp>
+        <p:nvSpPr>
+          <p:cNvPr id="2" name="Title 1">
+            <a:extLst>
+              <a:ext uri="{FF2B5EF4-FFF2-40B4-BE49-F238E27FC236}">
+                <a16:creationId xmlns:a16="http://schemas.microsoft.com/office/drawing/2014/main" id="{D44BCB7C-A6FC-4118-9027-468ECFDE6455}"/>
+              </a:ext>
+            </a:extLst>
+          </p:cNvPr>
+          <p:cNvSpPr>
+            <a:spLocks noGrp="1"/>
+          </p:cNvSpPr>
+          <p:nvPr>
+            <p:ph type="ctrTitle"/>
+          </p:nvPr>
+        </p:nvSpPr>
+        <p:spPr>
+          <a:xfrm>
+            <a:off x="3962399" y="2573867"/>
+            <a:ext cx="7197726" cy="2421464"/>
+          </a:xfrm>
+        </p:spPr>
+        <p:txBody>
+          <a:bodyPr>
+            <a:normAutofit/>
+          </a:bodyPr>
+          <a:lstStyle/>
+          <a:p>
+            <a:r>
+              <a:rPr lang="en-US" dirty="0"/>
+              <a:t>Thank You!</a:t>
+            </a:r>
+          </a:p>
+        </p:txBody>
+      </p:sp>
+      <p:sp>
+        <p:nvSpPr>
+          <p:cNvPr id="3" name="Subtitle 2">
+            <a:extLst>
+              <a:ext uri="{FF2B5EF4-FFF2-40B4-BE49-F238E27FC236}">
+                <a16:creationId xmlns:a16="http://schemas.microsoft.com/office/drawing/2014/main" id="{4B64FA72-B055-4AE3-A6FD-8071BD687CBE}"/>
+              </a:ext>
+            </a:extLst>
+          </p:cNvPr>
+          <p:cNvSpPr>
+            <a:spLocks noGrp="1"/>
+          </p:cNvSpPr>
+          <p:nvPr>
+            <p:ph type="subTitle" idx="1"/>
+          </p:nvPr>
+        </p:nvSpPr>
+        <p:spPr>
+          <a:xfrm>
+            <a:off x="3962399" y="4995332"/>
+            <a:ext cx="7197726" cy="1405467"/>
+          </a:xfrm>
+        </p:spPr>
+        <p:txBody>
+          <a:bodyPr>
+            <a:normAutofit/>
+          </a:bodyPr>
+          <a:lstStyle/>
+          <a:p>
+            <a:r>
+              <a:rPr lang="en-US" dirty="0">
+                <a:solidFill>
+                  <a:schemeClr val="accent1">
+                    <a:lumMod val="40000"/>
+                    <a:lumOff val="60000"/>
+                  </a:schemeClr>
+                </a:solidFill>
+              </a:rPr>
+              <a:t>nourkamaly26@gmail.com</a:t>
+            </a:r>
+          </a:p>
+        </p:txBody>
+      </p:sp>
+    </p:spTree>
+    <p:extLst>
+      <p:ext uri="{BB962C8B-B14F-4D97-AF65-F5344CB8AC3E}">
+        <p14:creationId xmlns:p14="http://schemas.microsoft.com/office/powerpoint/2010/main" val="2939930866"/>
+      </p:ext>
+    </p:extLst>
+  </p:cSld>
+  <p:clrMapOvr>
+    <a:masterClrMapping/>
+  </p:clrMapOvr>
+</p:sld>
+</file>
+
 <file path=ppt/slides/slide2.xml><?xml version="1.0" encoding="utf-8"?>
 <p:sld xmlns:a="http://schemas.openxmlformats.org/drawingml/2006/main" xmlns:r="http://schemas.openxmlformats.org/officeDocument/2006/relationships" xmlns:p="http://schemas.openxmlformats.org/presentationml/2006/main">
   <p:cSld>
@@ -14776,7 +14924,7 @@
           <a:p>
             <a:r>
               <a:rPr lang="en-US" dirty="0"/>
-              <a:t>Global technology</a:t>
+              <a:t>Feature importance</a:t>
             </a:r>
             <a:endParaRPr lang="ru-RU" dirty="0"/>
           </a:p>
@@ -23447,6 +23595,75 @@
   <p:cSld>
     <p:spTree>
       <p:nvGrpSpPr>
+        <p:cNvPr id="1" name="">
+          <a:extLst>
+            <a:ext uri="{FF2B5EF4-FFF2-40B4-BE49-F238E27FC236}">
+              <a16:creationId xmlns:a16="http://schemas.microsoft.com/office/drawing/2014/main" id="{89A6E41B-4936-1F0D-CB3D-731BBFA7B0F4}"/>
+            </a:ext>
+          </a:extLst>
+        </p:cNvPr>
+        <p:cNvGrpSpPr/>
+        <p:nvPr/>
+      </p:nvGrpSpPr>
+      <p:grpSpPr>
+        <a:xfrm>
+          <a:off x="0" y="0"/>
+          <a:ext cx="0" cy="0"/>
+          <a:chOff x="0" y="0"/>
+          <a:chExt cx="0" cy="0"/>
+        </a:xfrm>
+      </p:grpSpPr>
+      <p:sp>
+        <p:nvSpPr>
+          <p:cNvPr id="2" name="Title 1">
+            <a:extLst>
+              <a:ext uri="{FF2B5EF4-FFF2-40B4-BE49-F238E27FC236}">
+                <a16:creationId xmlns:a16="http://schemas.microsoft.com/office/drawing/2014/main" id="{751F8B4A-8760-4F57-9489-14EB3D8F69C6}"/>
+              </a:ext>
+            </a:extLst>
+          </p:cNvPr>
+          <p:cNvSpPr>
+            <a:spLocks noGrp="1"/>
+          </p:cNvSpPr>
+          <p:nvPr>
+            <p:ph type="title"/>
+          </p:nvPr>
+        </p:nvSpPr>
+        <p:spPr>
+          <a:xfrm>
+            <a:off x="288236" y="202096"/>
+            <a:ext cx="10131425" cy="1456267"/>
+          </a:xfrm>
+        </p:spPr>
+        <p:txBody>
+          <a:bodyPr/>
+          <a:lstStyle/>
+          <a:p>
+            <a:r>
+              <a:rPr lang="en-US" dirty="0"/>
+              <a:t>Experiments</a:t>
+            </a:r>
+          </a:p>
+        </p:txBody>
+      </p:sp>
+    </p:spTree>
+    <p:extLst>
+      <p:ext uri="{BB962C8B-B14F-4D97-AF65-F5344CB8AC3E}">
+        <p14:creationId xmlns:p14="http://schemas.microsoft.com/office/powerpoint/2010/main" val="2092283010"/>
+      </p:ext>
+    </p:extLst>
+  </p:cSld>
+  <p:clrMapOvr>
+    <a:masterClrMapping/>
+  </p:clrMapOvr>
+</p:sld>
+</file>
+
+<file path=ppt/slides/slide4.xml><?xml version="1.0" encoding="utf-8"?>
+<p:sld xmlns:a="http://schemas.openxmlformats.org/drawingml/2006/main" xmlns:r="http://schemas.openxmlformats.org/officeDocument/2006/relationships" xmlns:p="http://schemas.openxmlformats.org/presentationml/2006/main">
+  <p:cSld>
+    <p:spTree>
+      <p:nvGrpSpPr>
         <p:cNvPr id="1" name=""/>
         <p:cNvGrpSpPr/>
         <p:nvPr/>
@@ -23536,7 +23753,379 @@
 </p:sld>
 </file>
 
-<file path=ppt/slides/slide4.xml><?xml version="1.0" encoding="utf-8"?>
+<file path=ppt/slides/slide5.xml><?xml version="1.0" encoding="utf-8"?>
+<p:sld xmlns:a="http://schemas.openxmlformats.org/drawingml/2006/main" xmlns:r="http://schemas.openxmlformats.org/officeDocument/2006/relationships" xmlns:p="http://schemas.openxmlformats.org/presentationml/2006/main">
+  <p:cSld>
+    <p:spTree>
+      <p:nvGrpSpPr>
+        <p:cNvPr id="1" name=""/>
+        <p:cNvGrpSpPr/>
+        <p:nvPr/>
+      </p:nvGrpSpPr>
+      <p:grpSpPr>
+        <a:xfrm>
+          <a:off x="0" y="0"/>
+          <a:ext cx="0" cy="0"/>
+          <a:chOff x="0" y="0"/>
+          <a:chExt cx="0" cy="0"/>
+        </a:xfrm>
+      </p:grpSpPr>
+      <p:sp>
+        <p:nvSpPr>
+          <p:cNvPr id="2" name="Title 1">
+            <a:extLst>
+              <a:ext uri="{FF2B5EF4-FFF2-40B4-BE49-F238E27FC236}">
+                <a16:creationId xmlns:a16="http://schemas.microsoft.com/office/drawing/2014/main" id="{B91B2317-9FFC-E35C-D4E2-63AC6C850B5D}"/>
+              </a:ext>
+            </a:extLst>
+          </p:cNvPr>
+          <p:cNvSpPr>
+            <a:spLocks noGrp="1"/>
+          </p:cNvSpPr>
+          <p:nvPr>
+            <p:ph type="title"/>
+          </p:nvPr>
+        </p:nvSpPr>
+        <p:spPr/>
+        <p:txBody>
+          <a:bodyPr/>
+          <a:lstStyle/>
+          <a:p>
+            <a:r>
+              <a:rPr lang="en-US" dirty="0"/>
+              <a:t>Preprocessing Pipeline</a:t>
+            </a:r>
+          </a:p>
+        </p:txBody>
+      </p:sp>
+    </p:spTree>
+    <p:extLst>
+      <p:ext uri="{BB962C8B-B14F-4D97-AF65-F5344CB8AC3E}">
+        <p14:creationId xmlns:p14="http://schemas.microsoft.com/office/powerpoint/2010/main" val="653629078"/>
+      </p:ext>
+    </p:extLst>
+  </p:cSld>
+  <p:clrMapOvr>
+    <a:masterClrMapping/>
+  </p:clrMapOvr>
+</p:sld>
+</file>
+
+<file path=ppt/slides/slide6.xml><?xml version="1.0" encoding="utf-8"?>
+<p:sld xmlns:a="http://schemas.openxmlformats.org/drawingml/2006/main" xmlns:r="http://schemas.openxmlformats.org/officeDocument/2006/relationships" xmlns:p="http://schemas.openxmlformats.org/presentationml/2006/main">
+  <p:cSld>
+    <p:spTree>
+      <p:nvGrpSpPr>
+        <p:cNvPr id="1" name="">
+          <a:extLst>
+            <a:ext uri="{FF2B5EF4-FFF2-40B4-BE49-F238E27FC236}">
+              <a16:creationId xmlns:a16="http://schemas.microsoft.com/office/drawing/2014/main" id="{FEEAD540-726C-1779-BAD7-F495A0F4C502}"/>
+            </a:ext>
+          </a:extLst>
+        </p:cNvPr>
+        <p:cNvGrpSpPr/>
+        <p:nvPr/>
+      </p:nvGrpSpPr>
+      <p:grpSpPr>
+        <a:xfrm>
+          <a:off x="0" y="0"/>
+          <a:ext cx="0" cy="0"/>
+          <a:chOff x="0" y="0"/>
+          <a:chExt cx="0" cy="0"/>
+        </a:xfrm>
+      </p:grpSpPr>
+      <p:sp>
+        <p:nvSpPr>
+          <p:cNvPr id="2" name="Title 1">
+            <a:extLst>
+              <a:ext uri="{FF2B5EF4-FFF2-40B4-BE49-F238E27FC236}">
+                <a16:creationId xmlns:a16="http://schemas.microsoft.com/office/drawing/2014/main" id="{DD9C8B39-4D6E-3D08-65AC-FA7ED9E23865}"/>
+              </a:ext>
+            </a:extLst>
+          </p:cNvPr>
+          <p:cNvSpPr>
+            <a:spLocks noGrp="1"/>
+          </p:cNvSpPr>
+          <p:nvPr>
+            <p:ph type="title"/>
+          </p:nvPr>
+        </p:nvSpPr>
+        <p:spPr>
+          <a:xfrm>
+            <a:off x="202325" y="0"/>
+            <a:ext cx="10131425" cy="1456267"/>
+          </a:xfrm>
+        </p:spPr>
+        <p:txBody>
+          <a:bodyPr/>
+          <a:lstStyle/>
+          <a:p>
+            <a:r>
+              <a:rPr lang="en-US" dirty="0"/>
+              <a:t>Experiments - SMOTE</a:t>
+            </a:r>
+          </a:p>
+        </p:txBody>
+      </p:sp>
+      <p:pic>
+        <p:nvPicPr>
+          <p:cNvPr id="4" name="Picture 3" descr="A table with numbers and symbols&#10;&#10;AI-generated content may be incorrect.">
+            <a:extLst>
+              <a:ext uri="{FF2B5EF4-FFF2-40B4-BE49-F238E27FC236}">
+                <a16:creationId xmlns:a16="http://schemas.microsoft.com/office/drawing/2014/main" id="{F42582D4-2224-70B6-A808-EFC9D279A948}"/>
+              </a:ext>
+            </a:extLst>
+          </p:cNvPr>
+          <p:cNvPicPr>
+            <a:picLocks noChangeAspect="1"/>
+          </p:cNvPicPr>
+          <p:nvPr/>
+        </p:nvPicPr>
+        <p:blipFill>
+          <a:blip r:embed="rId2"/>
+          <a:stretch>
+            <a:fillRect/>
+          </a:stretch>
+        </p:blipFill>
+        <p:spPr>
+          <a:xfrm>
+            <a:off x="1040766" y="1085485"/>
+            <a:ext cx="9776460" cy="5615940"/>
+          </a:xfrm>
+          <a:prstGeom prst="rect">
+            <a:avLst/>
+          </a:prstGeom>
+        </p:spPr>
+      </p:pic>
+    </p:spTree>
+    <p:extLst>
+      <p:ext uri="{BB962C8B-B14F-4D97-AF65-F5344CB8AC3E}">
+        <p14:creationId xmlns:p14="http://schemas.microsoft.com/office/powerpoint/2010/main" val="1482221850"/>
+      </p:ext>
+    </p:extLst>
+  </p:cSld>
+  <p:clrMapOvr>
+    <a:masterClrMapping/>
+  </p:clrMapOvr>
+</p:sld>
+</file>
+
+<file path=ppt/slides/slide7.xml><?xml version="1.0" encoding="utf-8"?>
+<p:sld xmlns:a="http://schemas.openxmlformats.org/drawingml/2006/main" xmlns:r="http://schemas.openxmlformats.org/officeDocument/2006/relationships" xmlns:p="http://schemas.openxmlformats.org/presentationml/2006/main">
+  <p:cSld>
+    <p:spTree>
+      <p:nvGrpSpPr>
+        <p:cNvPr id="1" name="">
+          <a:extLst>
+            <a:ext uri="{FF2B5EF4-FFF2-40B4-BE49-F238E27FC236}">
+              <a16:creationId xmlns:a16="http://schemas.microsoft.com/office/drawing/2014/main" id="{DE383C4C-29E3-CDB5-A814-D0025212F258}"/>
+            </a:ext>
+          </a:extLst>
+        </p:cNvPr>
+        <p:cNvGrpSpPr/>
+        <p:nvPr/>
+      </p:nvGrpSpPr>
+      <p:grpSpPr>
+        <a:xfrm>
+          <a:off x="0" y="0"/>
+          <a:ext cx="0" cy="0"/>
+          <a:chOff x="0" y="0"/>
+          <a:chExt cx="0" cy="0"/>
+        </a:xfrm>
+      </p:grpSpPr>
+      <p:sp>
+        <p:nvSpPr>
+          <p:cNvPr id="2" name="Title 1">
+            <a:extLst>
+              <a:ext uri="{FF2B5EF4-FFF2-40B4-BE49-F238E27FC236}">
+                <a16:creationId xmlns:a16="http://schemas.microsoft.com/office/drawing/2014/main" id="{4977D33B-489B-3FDF-B9AF-84B297D7F47A}"/>
+              </a:ext>
+            </a:extLst>
+          </p:cNvPr>
+          <p:cNvSpPr>
+            <a:spLocks noGrp="1"/>
+          </p:cNvSpPr>
+          <p:nvPr>
+            <p:ph type="title"/>
+          </p:nvPr>
+        </p:nvSpPr>
+        <p:spPr>
+          <a:xfrm>
+            <a:off x="202325" y="0"/>
+            <a:ext cx="10131425" cy="1456267"/>
+          </a:xfrm>
+        </p:spPr>
+        <p:txBody>
+          <a:bodyPr/>
+          <a:lstStyle/>
+          <a:p>
+            <a:r>
+              <a:rPr lang="en-US" dirty="0"/>
+              <a:t>Experiments</a:t>
+            </a:r>
+          </a:p>
+        </p:txBody>
+      </p:sp>
+      <p:pic>
+        <p:nvPicPr>
+          <p:cNvPr id="7" name="Picture 6" descr="A diagram of a company's data&#10;&#10;AI-generated content may be incorrect.">
+            <a:extLst>
+              <a:ext uri="{FF2B5EF4-FFF2-40B4-BE49-F238E27FC236}">
+                <a16:creationId xmlns:a16="http://schemas.microsoft.com/office/drawing/2014/main" id="{EC9F06C0-85A0-E020-AEA2-9E34EA8A76D2}"/>
+              </a:ext>
+            </a:extLst>
+          </p:cNvPr>
+          <p:cNvPicPr>
+            <a:picLocks noChangeAspect="1"/>
+          </p:cNvPicPr>
+          <p:nvPr/>
+        </p:nvPicPr>
+        <p:blipFill>
+          <a:blip r:embed="rId2"/>
+          <a:stretch>
+            <a:fillRect/>
+          </a:stretch>
+        </p:blipFill>
+        <p:spPr>
+          <a:xfrm>
+            <a:off x="716803" y="1192033"/>
+            <a:ext cx="7502637" cy="5416939"/>
+          </a:xfrm>
+          <a:prstGeom prst="rect">
+            <a:avLst/>
+          </a:prstGeom>
+        </p:spPr>
+      </p:pic>
+      <p:sp>
+        <p:nvSpPr>
+          <p:cNvPr id="8" name="TextBox 7">
+            <a:extLst>
+              <a:ext uri="{FF2B5EF4-FFF2-40B4-BE49-F238E27FC236}">
+                <a16:creationId xmlns:a16="http://schemas.microsoft.com/office/drawing/2014/main" id="{D7227B38-83DF-657B-9545-9A2CFA88F130}"/>
+              </a:ext>
+            </a:extLst>
+          </p:cNvPr>
+          <p:cNvSpPr txBox="1"/>
+          <p:nvPr/>
+        </p:nvSpPr>
+        <p:spPr>
+          <a:xfrm>
+            <a:off x="8520558" y="3007360"/>
+            <a:ext cx="3183762" cy="1200329"/>
+          </a:xfrm>
+          <a:prstGeom prst="rect">
+            <a:avLst/>
+          </a:prstGeom>
+          <a:noFill/>
+        </p:spPr>
+        <p:txBody>
+          <a:bodyPr wrap="square" rtlCol="0">
+            <a:spAutoFit/>
+          </a:bodyPr>
+          <a:lstStyle/>
+          <a:p>
+            <a:r>
+              <a:rPr lang="en-US" dirty="0"/>
+              <a:t>Orange -&gt; no class </a:t>
+            </a:r>
+          </a:p>
+          <a:p>
+            <a:r>
+              <a:rPr lang="en-US" dirty="0"/>
+              <a:t>Blue -&gt; yes class</a:t>
+            </a:r>
+          </a:p>
+          <a:p>
+            <a:r>
+              <a:rPr lang="en-US" dirty="0"/>
+              <a:t>More saturated shade -&gt; more purity</a:t>
+            </a:r>
+          </a:p>
+        </p:txBody>
+      </p:sp>
+    </p:spTree>
+    <p:extLst>
+      <p:ext uri="{BB962C8B-B14F-4D97-AF65-F5344CB8AC3E}">
+        <p14:creationId xmlns:p14="http://schemas.microsoft.com/office/powerpoint/2010/main" val="740028159"/>
+      </p:ext>
+    </p:extLst>
+  </p:cSld>
+  <p:clrMapOvr>
+    <a:masterClrMapping/>
+  </p:clrMapOvr>
+</p:sld>
+</file>
+
+<file path=ppt/slides/slide8.xml><?xml version="1.0" encoding="utf-8"?>
+<p:sld xmlns:a="http://schemas.openxmlformats.org/drawingml/2006/main" xmlns:r="http://schemas.openxmlformats.org/officeDocument/2006/relationships" xmlns:p="http://schemas.openxmlformats.org/presentationml/2006/main">
+  <p:cSld>
+    <p:spTree>
+      <p:nvGrpSpPr>
+        <p:cNvPr id="1" name="">
+          <a:extLst>
+            <a:ext uri="{FF2B5EF4-FFF2-40B4-BE49-F238E27FC236}">
+              <a16:creationId xmlns:a16="http://schemas.microsoft.com/office/drawing/2014/main" id="{DBD0A6FF-8691-C1C3-E161-B26760E86CD7}"/>
+            </a:ext>
+          </a:extLst>
+        </p:cNvPr>
+        <p:cNvGrpSpPr/>
+        <p:nvPr/>
+      </p:nvGrpSpPr>
+      <p:grpSpPr>
+        <a:xfrm>
+          <a:off x="0" y="0"/>
+          <a:ext cx="0" cy="0"/>
+          <a:chOff x="0" y="0"/>
+          <a:chExt cx="0" cy="0"/>
+        </a:xfrm>
+      </p:grpSpPr>
+      <p:sp>
+        <p:nvSpPr>
+          <p:cNvPr id="2" name="Title 1">
+            <a:extLst>
+              <a:ext uri="{FF2B5EF4-FFF2-40B4-BE49-F238E27FC236}">
+                <a16:creationId xmlns:a16="http://schemas.microsoft.com/office/drawing/2014/main" id="{F6D8FD6F-9D40-5544-0104-D4B115F962AD}"/>
+              </a:ext>
+            </a:extLst>
+          </p:cNvPr>
+          <p:cNvSpPr>
+            <a:spLocks noGrp="1"/>
+          </p:cNvSpPr>
+          <p:nvPr>
+            <p:ph type="title"/>
+          </p:nvPr>
+        </p:nvSpPr>
+        <p:spPr>
+          <a:xfrm>
+            <a:off x="202325" y="0"/>
+            <a:ext cx="10131425" cy="1456267"/>
+          </a:xfrm>
+        </p:spPr>
+        <p:txBody>
+          <a:bodyPr/>
+          <a:lstStyle/>
+          <a:p>
+            <a:r>
+              <a:rPr lang="en-US" dirty="0"/>
+              <a:t>Experiments – Random Over Sampling</a:t>
+            </a:r>
+          </a:p>
+        </p:txBody>
+      </p:sp>
+    </p:spTree>
+    <p:extLst>
+      <p:ext uri="{BB962C8B-B14F-4D97-AF65-F5344CB8AC3E}">
+        <p14:creationId xmlns:p14="http://schemas.microsoft.com/office/powerpoint/2010/main" val="888447733"/>
+      </p:ext>
+    </p:extLst>
+  </p:cSld>
+  <p:clrMapOvr>
+    <a:masterClrMapping/>
+  </p:clrMapOvr>
+</p:sld>
+</file>
+
+<file path=ppt/slides/slide9.xml><?xml version="1.0" encoding="utf-8"?>
 <p:sld xmlns:a="http://schemas.openxmlformats.org/drawingml/2006/main" xmlns:r="http://schemas.openxmlformats.org/officeDocument/2006/relationships" xmlns:p="http://schemas.openxmlformats.org/presentationml/2006/main">
   <p:cSld>
     <p:spTree>
@@ -23848,149 +24437,6 @@
     <p:extLst>
       <p:ext uri="{BB962C8B-B14F-4D97-AF65-F5344CB8AC3E}">
         <p14:creationId xmlns:p14="http://schemas.microsoft.com/office/powerpoint/2010/main" val="1974828406"/>
-      </p:ext>
-    </p:extLst>
-  </p:cSld>
-  <p:clrMapOvr>
-    <a:masterClrMapping/>
-  </p:clrMapOvr>
-</p:sld>
-</file>
-
-<file path=ppt/slides/slide5.xml><?xml version="1.0" encoding="utf-8"?>
-<p:sld xmlns:a="http://schemas.openxmlformats.org/drawingml/2006/main" xmlns:r="http://schemas.openxmlformats.org/officeDocument/2006/relationships" xmlns:p="http://schemas.openxmlformats.org/presentationml/2006/main">
-  <p:cSld>
-    <p:spTree>
-      <p:nvGrpSpPr>
-        <p:cNvPr id="1" name=""/>
-        <p:cNvGrpSpPr/>
-        <p:nvPr/>
-      </p:nvGrpSpPr>
-      <p:grpSpPr>
-        <a:xfrm>
-          <a:off x="0" y="0"/>
-          <a:ext cx="0" cy="0"/>
-          <a:chOff x="0" y="0"/>
-          <a:chExt cx="0" cy="0"/>
-        </a:xfrm>
-      </p:grpSpPr>
-      <p:pic>
-        <p:nvPicPr>
-          <p:cNvPr id="5" name="Picture 4" descr="light spots">
-            <a:extLst>
-              <a:ext uri="{FF2B5EF4-FFF2-40B4-BE49-F238E27FC236}">
-                <a16:creationId xmlns:a16="http://schemas.microsoft.com/office/drawing/2014/main" id="{20A520D0-11CF-4639-8537-F56A8A2FDCFD}"/>
-              </a:ext>
-            </a:extLst>
-          </p:cNvPr>
-          <p:cNvPicPr>
-            <a:picLocks noChangeAspect="1"/>
-          </p:cNvPicPr>
-          <p:nvPr/>
-        </p:nvPicPr>
-        <p:blipFill rotWithShape="1">
-          <a:blip r:embed="rId3">
-            <a:alphaModFix amt="20000"/>
-            <a:extLst>
-              <a:ext uri="{28A0092B-C50C-407E-A947-70E740481C1C}">
-                <a14:useLocalDpi xmlns:a14="http://schemas.microsoft.com/office/drawing/2010/main"/>
-              </a:ext>
-            </a:extLst>
-          </a:blip>
-          <a:srcRect/>
-          <a:stretch/>
-        </p:blipFill>
-        <p:spPr>
-          <a:xfrm>
-            <a:off x="20" y="10"/>
-            <a:ext cx="12191980" cy="6857990"/>
-          </a:xfrm>
-          <a:prstGeom prst="rect">
-            <a:avLst/>
-          </a:prstGeom>
-        </p:spPr>
-      </p:pic>
-      <p:sp>
-        <p:nvSpPr>
-          <p:cNvPr id="2" name="Title 1">
-            <a:extLst>
-              <a:ext uri="{FF2B5EF4-FFF2-40B4-BE49-F238E27FC236}">
-                <a16:creationId xmlns:a16="http://schemas.microsoft.com/office/drawing/2014/main" id="{D44BCB7C-A6FC-4118-9027-468ECFDE6455}"/>
-              </a:ext>
-            </a:extLst>
-          </p:cNvPr>
-          <p:cNvSpPr>
-            <a:spLocks noGrp="1"/>
-          </p:cNvSpPr>
-          <p:nvPr>
-            <p:ph type="ctrTitle"/>
-          </p:nvPr>
-        </p:nvSpPr>
-        <p:spPr>
-          <a:xfrm>
-            <a:off x="3962399" y="2573867"/>
-            <a:ext cx="7197726" cy="2421464"/>
-          </a:xfrm>
-        </p:spPr>
-        <p:txBody>
-          <a:bodyPr>
-            <a:normAutofit/>
-          </a:bodyPr>
-          <a:lstStyle/>
-          <a:p>
-            <a:r>
-              <a:rPr lang="en-US" dirty="0"/>
-              <a:t>Thank You!</a:t>
-            </a:r>
-          </a:p>
-        </p:txBody>
-      </p:sp>
-      <p:sp>
-        <p:nvSpPr>
-          <p:cNvPr id="3" name="Subtitle 2">
-            <a:extLst>
-              <a:ext uri="{FF2B5EF4-FFF2-40B4-BE49-F238E27FC236}">
-                <a16:creationId xmlns:a16="http://schemas.microsoft.com/office/drawing/2014/main" id="{4B64FA72-B055-4AE3-A6FD-8071BD687CBE}"/>
-              </a:ext>
-            </a:extLst>
-          </p:cNvPr>
-          <p:cNvSpPr>
-            <a:spLocks noGrp="1"/>
-          </p:cNvSpPr>
-          <p:nvPr>
-            <p:ph type="subTitle" idx="1"/>
-          </p:nvPr>
-        </p:nvSpPr>
-        <p:spPr>
-          <a:xfrm>
-            <a:off x="3962399" y="4995332"/>
-            <a:ext cx="7197726" cy="1405467"/>
-          </a:xfrm>
-        </p:spPr>
-        <p:txBody>
-          <a:bodyPr>
-            <a:normAutofit/>
-          </a:bodyPr>
-          <a:lstStyle/>
-          <a:p>
-            <a:r>
-              <a:rPr lang="en-US" dirty="0">
-                <a:solidFill>
-                  <a:schemeClr val="accent1">
-                    <a:lumMod val="40000"/>
-                    <a:lumOff val="60000"/>
-                  </a:schemeClr>
-                </a:solidFill>
-              </a:rPr>
-              <a:t>nourkamaly26@gmail.com</a:t>
-            </a:r>
-          </a:p>
-        </p:txBody>
-      </p:sp>
-    </p:spTree>
-    <p:extLst>
-      <p:ext uri="{BB962C8B-B14F-4D97-AF65-F5344CB8AC3E}">
-        <p14:creationId xmlns:p14="http://schemas.microsoft.com/office/powerpoint/2010/main" val="2939930866"/>
       </p:ext>
     </p:extLst>
   </p:cSld>

</xml_diff>